<commit_message>
Added youtube link to pptx
</commit_message>
<xml_diff>
--- a/ScienceQuests.pptx
+++ b/ScienceQuests.pptx
@@ -4667,8 +4667,8 @@
           </a:prstGeom>
         </p:spPr>
       </p:pic>
-      <mc:AlternateContent xmlns:mc="http://schemas.openxmlformats.org/markup-compatibility/2006">
-        <mc:Choice xmlns:p14="http://schemas.microsoft.com/office/powerpoint/2010/main" Requires="p14">
+      <mc:AlternateContent xmlns:mc="http://schemas.openxmlformats.org/markup-compatibility/2006" xmlns:p14="http://schemas.microsoft.com/office/powerpoint/2010/main">
+        <mc:Choice Requires="p14">
           <p:contentPart p14:bwMode="auto" r:id="rId6">
             <p14:nvContentPartPr>
               <p14:cNvPr id="4" name="Cerneală 3">
@@ -4687,7 +4687,7 @@
             </p14:xfrm>
           </p:contentPart>
         </mc:Choice>
-        <mc:Fallback>
+        <mc:Fallback xmlns="">
           <p:pic>
             <p:nvPicPr>
               <p:cNvPr id="4" name="Cerneală 3">
@@ -4718,8 +4718,8 @@
           </p:pic>
         </mc:Fallback>
       </mc:AlternateContent>
-      <mc:AlternateContent xmlns:mc="http://schemas.openxmlformats.org/markup-compatibility/2006">
-        <mc:Choice xmlns:p14="http://schemas.microsoft.com/office/powerpoint/2010/main" Requires="p14">
+      <mc:AlternateContent xmlns:mc="http://schemas.openxmlformats.org/markup-compatibility/2006" xmlns:p14="http://schemas.microsoft.com/office/powerpoint/2010/main">
+        <mc:Choice Requires="p14">
           <p:contentPart p14:bwMode="auto" r:id="rId8">
             <p14:nvContentPartPr>
               <p14:cNvPr id="8" name="Cerneală 7">
@@ -4738,7 +4738,7 @@
             </p14:xfrm>
           </p:contentPart>
         </mc:Choice>
-        <mc:Fallback>
+        <mc:Fallback xmlns="">
           <p:pic>
             <p:nvPicPr>
               <p:cNvPr id="8" name="Cerneală 7">
@@ -4769,8 +4769,8 @@
           </p:pic>
         </mc:Fallback>
       </mc:AlternateContent>
-      <mc:AlternateContent xmlns:mc="http://schemas.openxmlformats.org/markup-compatibility/2006">
-        <mc:Choice xmlns:p14="http://schemas.microsoft.com/office/powerpoint/2010/main" Requires="p14">
+      <mc:AlternateContent xmlns:mc="http://schemas.openxmlformats.org/markup-compatibility/2006" xmlns:p14="http://schemas.microsoft.com/office/powerpoint/2010/main">
+        <mc:Choice Requires="p14">
           <p:contentPart p14:bwMode="auto" r:id="rId10">
             <p14:nvContentPartPr>
               <p14:cNvPr id="9" name="Cerneală 8">
@@ -4789,7 +4789,7 @@
             </p14:xfrm>
           </p:contentPart>
         </mc:Choice>
-        <mc:Fallback>
+        <mc:Fallback xmlns="">
           <p:pic>
             <p:nvPicPr>
               <p:cNvPr id="9" name="Cerneală 8">
@@ -6139,13 +6139,13 @@
   <p:clrMapOvr>
     <a:masterClrMapping/>
   </p:clrMapOvr>
-  <mc:AlternateContent xmlns:mc="http://schemas.openxmlformats.org/markup-compatibility/2006">
-    <mc:Choice xmlns:p159="http://schemas.microsoft.com/office/powerpoint/2015/09/main" Requires="p159">
+  <mc:AlternateContent xmlns:mc="http://schemas.openxmlformats.org/markup-compatibility/2006" xmlns:p159="http://schemas.microsoft.com/office/powerpoint/2015/09/main">
+    <mc:Choice Requires="p159">
       <p:transition xmlns:p14="http://schemas.microsoft.com/office/powerpoint/2010/main" spd="slow" p14:dur="2000">
         <p159:morph option="byObject"/>
       </p:transition>
     </mc:Choice>
-    <mc:Fallback>
+    <mc:Fallback xmlns="">
       <p:transition spd="slow">
         <p:fade/>
       </p:transition>
@@ -6965,13 +6965,13 @@
   <p:clrMapOvr>
     <a:masterClrMapping/>
   </p:clrMapOvr>
-  <mc:AlternateContent xmlns:mc="http://schemas.openxmlformats.org/markup-compatibility/2006">
-    <mc:Choice xmlns:p159="http://schemas.microsoft.com/office/powerpoint/2015/09/main" Requires="p159">
+  <mc:AlternateContent xmlns:mc="http://schemas.openxmlformats.org/markup-compatibility/2006" xmlns:p159="http://schemas.microsoft.com/office/powerpoint/2015/09/main">
+    <mc:Choice Requires="p159">
       <p:transition xmlns:p14="http://schemas.microsoft.com/office/powerpoint/2010/main" spd="slow" p14:dur="2000">
         <p159:morph option="byObject"/>
       </p:transition>
     </mc:Choice>
-    <mc:Fallback>
+    <mc:Fallback xmlns="">
       <p:transition spd="slow">
         <p:fade/>
       </p:transition>
@@ -7505,13 +7505,13 @@
   <p:clrMapOvr>
     <a:masterClrMapping/>
   </p:clrMapOvr>
-  <mc:AlternateContent xmlns:mc="http://schemas.openxmlformats.org/markup-compatibility/2006">
-    <mc:Choice xmlns:p159="http://schemas.microsoft.com/office/powerpoint/2015/09/main" Requires="p159">
+  <mc:AlternateContent xmlns:mc="http://schemas.openxmlformats.org/markup-compatibility/2006" xmlns:p159="http://schemas.microsoft.com/office/powerpoint/2015/09/main">
+    <mc:Choice Requires="p159">
       <p:transition xmlns:p14="http://schemas.microsoft.com/office/powerpoint/2010/main" spd="slow" p14:dur="2000">
         <p159:morph option="byObject"/>
       </p:transition>
     </mc:Choice>
-    <mc:Fallback>
+    <mc:Fallback xmlns="">
       <p:transition spd="slow">
         <p:fade/>
       </p:transition>
@@ -7677,7 +7677,7 @@
         <p:spPr>
           <a:xfrm>
             <a:off x="636710" y="3011654"/>
-            <a:ext cx="8014464" cy="1569660"/>
+            <a:ext cx="8014464" cy="1938992"/>
           </a:xfrm>
           <a:prstGeom prst="rect">
             <a:avLst/>
@@ -7750,6 +7750,20 @@
               </a:rPr>
               <a:t>: </a:t>
             </a:r>
+            <a:r>
+              <a:rPr lang="ro-RO" sz="2400" dirty="0">
+                <a:solidFill>
+                  <a:schemeClr val="bg1"/>
+                </a:solidFill>
+                <a:hlinkClick r:id="rId5"/>
+              </a:rPr>
+              <a:t>https://youtu.be/nTsHQOLqoOo</a:t>
+            </a:r>
+            <a:endParaRPr lang="ro-RO" sz="2400" dirty="0">
+              <a:solidFill>
+                <a:schemeClr val="bg1"/>
+              </a:solidFill>
+            </a:endParaRPr>
           </a:p>
         </p:txBody>
       </p:sp>
@@ -7768,7 +7782,7 @@
           <p:nvPr/>
         </p:nvPicPr>
         <p:blipFill>
-          <a:blip r:embed="rId5">
+          <a:blip r:embed="rId6">
             <a:extLst>
               <a:ext uri="{28A0092B-C50C-407E-A947-70E740481C1C}">
                 <a14:useLocalDpi xmlns:a14="http://schemas.microsoft.com/office/drawing/2010/main" val="0"/>
@@ -7799,13 +7813,13 @@
   <p:clrMapOvr>
     <a:masterClrMapping/>
   </p:clrMapOvr>
-  <mc:AlternateContent xmlns:mc="http://schemas.openxmlformats.org/markup-compatibility/2006">
-    <mc:Choice xmlns:p159="http://schemas.microsoft.com/office/powerpoint/2015/09/main" Requires="p159">
+  <mc:AlternateContent xmlns:mc="http://schemas.openxmlformats.org/markup-compatibility/2006" xmlns:p159="http://schemas.microsoft.com/office/powerpoint/2015/09/main">
+    <mc:Choice Requires="p159">
       <p:transition xmlns:p14="http://schemas.microsoft.com/office/powerpoint/2010/main" spd="slow" p14:dur="2000">
         <p159:morph option="byObject"/>
       </p:transition>
     </mc:Choice>
-    <mc:Fallback>
+    <mc:Fallback xmlns="">
       <p:transition spd="slow">
         <p:fade/>
       </p:transition>
@@ -8146,13 +8160,13 @@
   <p:clrMapOvr>
     <a:masterClrMapping/>
   </p:clrMapOvr>
-  <mc:AlternateContent xmlns:mc="http://schemas.openxmlformats.org/markup-compatibility/2006">
-    <mc:Choice xmlns:p159="http://schemas.microsoft.com/office/powerpoint/2015/09/main" Requires="p159">
+  <mc:AlternateContent xmlns:mc="http://schemas.openxmlformats.org/markup-compatibility/2006" xmlns:p159="http://schemas.microsoft.com/office/powerpoint/2015/09/main">
+    <mc:Choice Requires="p159">
       <p:transition xmlns:p14="http://schemas.microsoft.com/office/powerpoint/2010/main" spd="slow" p14:dur="2000">
         <p159:morph option="byObject"/>
       </p:transition>
     </mc:Choice>
-    <mc:Fallback>
+    <mc:Fallback xmlns="">
       <p:transition spd="slow">
         <p:fade/>
       </p:transition>

</xml_diff>